<commit_message>
This figure need to be updated due to notation not font
</commit_message>
<xml_diff>
--- a/StudentGuideModule1/friction/normal_forces.pptx
+++ b/StudentGuideModule1/friction/normal_forces.pptx
@@ -241,7 +241,7 @@
           <a:p>
             <a:fld id="{62726365-80EF-4A22-BD1B-8B7BA9D18AD5}" type="datetimeFigureOut">
               <a:rPr lang="en-US" smtClean="0"/>
-              <a:t>7/23/2019</a:t>
+              <a:t>7/24/2019</a:t>
             </a:fld>
             <a:endParaRPr lang="en-US"/>
           </a:p>
@@ -409,7 +409,7 @@
           <a:p>
             <a:fld id="{62726365-80EF-4A22-BD1B-8B7BA9D18AD5}" type="datetimeFigureOut">
               <a:rPr lang="en-US" smtClean="0"/>
-              <a:t>7/23/2019</a:t>
+              <a:t>7/24/2019</a:t>
             </a:fld>
             <a:endParaRPr lang="en-US"/>
           </a:p>
@@ -587,7 +587,7 @@
           <a:p>
             <a:fld id="{62726365-80EF-4A22-BD1B-8B7BA9D18AD5}" type="datetimeFigureOut">
               <a:rPr lang="en-US" smtClean="0"/>
-              <a:t>7/23/2019</a:t>
+              <a:t>7/24/2019</a:t>
             </a:fld>
             <a:endParaRPr lang="en-US"/>
           </a:p>
@@ -755,7 +755,7 @@
           <a:p>
             <a:fld id="{62726365-80EF-4A22-BD1B-8B7BA9D18AD5}" type="datetimeFigureOut">
               <a:rPr lang="en-US" smtClean="0"/>
-              <a:t>7/23/2019</a:t>
+              <a:t>7/24/2019</a:t>
             </a:fld>
             <a:endParaRPr lang="en-US"/>
           </a:p>
@@ -1000,7 +1000,7 @@
           <a:p>
             <a:fld id="{62726365-80EF-4A22-BD1B-8B7BA9D18AD5}" type="datetimeFigureOut">
               <a:rPr lang="en-US" smtClean="0"/>
-              <a:t>7/23/2019</a:t>
+              <a:t>7/24/2019</a:t>
             </a:fld>
             <a:endParaRPr lang="en-US"/>
           </a:p>
@@ -1229,7 +1229,7 @@
           <a:p>
             <a:fld id="{62726365-80EF-4A22-BD1B-8B7BA9D18AD5}" type="datetimeFigureOut">
               <a:rPr lang="en-US" smtClean="0"/>
-              <a:t>7/23/2019</a:t>
+              <a:t>7/24/2019</a:t>
             </a:fld>
             <a:endParaRPr lang="en-US"/>
           </a:p>
@@ -1593,7 +1593,7 @@
           <a:p>
             <a:fld id="{62726365-80EF-4A22-BD1B-8B7BA9D18AD5}" type="datetimeFigureOut">
               <a:rPr lang="en-US" smtClean="0"/>
-              <a:t>7/23/2019</a:t>
+              <a:t>7/24/2019</a:t>
             </a:fld>
             <a:endParaRPr lang="en-US"/>
           </a:p>
@@ -1710,7 +1710,7 @@
           <a:p>
             <a:fld id="{62726365-80EF-4A22-BD1B-8B7BA9D18AD5}" type="datetimeFigureOut">
               <a:rPr lang="en-US" smtClean="0"/>
-              <a:t>7/23/2019</a:t>
+              <a:t>7/24/2019</a:t>
             </a:fld>
             <a:endParaRPr lang="en-US"/>
           </a:p>
@@ -1805,7 +1805,7 @@
           <a:p>
             <a:fld id="{62726365-80EF-4A22-BD1B-8B7BA9D18AD5}" type="datetimeFigureOut">
               <a:rPr lang="en-US" smtClean="0"/>
-              <a:t>7/23/2019</a:t>
+              <a:t>7/24/2019</a:t>
             </a:fld>
             <a:endParaRPr lang="en-US"/>
           </a:p>
@@ -2080,7 +2080,7 @@
           <a:p>
             <a:fld id="{62726365-80EF-4A22-BD1B-8B7BA9D18AD5}" type="datetimeFigureOut">
               <a:rPr lang="en-US" smtClean="0"/>
-              <a:t>7/23/2019</a:t>
+              <a:t>7/24/2019</a:t>
             </a:fld>
             <a:endParaRPr lang="en-US"/>
           </a:p>
@@ -2332,7 +2332,7 @@
           <a:p>
             <a:fld id="{62726365-80EF-4A22-BD1B-8B7BA9D18AD5}" type="datetimeFigureOut">
               <a:rPr lang="en-US" smtClean="0"/>
-              <a:t>7/23/2019</a:t>
+              <a:t>7/24/2019</a:t>
             </a:fld>
             <a:endParaRPr lang="en-US"/>
           </a:p>
@@ -2543,7 +2543,7 @@
           <a:p>
             <a:fld id="{62726365-80EF-4A22-BD1B-8B7BA9D18AD5}" type="datetimeFigureOut">
               <a:rPr lang="en-US" smtClean="0"/>
-              <a:t>7/23/2019</a:t>
+              <a:t>7/24/2019</a:t>
             </a:fld>
             <a:endParaRPr lang="en-US"/>
           </a:p>
@@ -3018,7 +3018,6 @@
           <a:p>
             <a:r>
               <a:rPr lang="en-US" sz="1050" dirty="0">
-                <a:latin typeface="Times New Roman" panose="02020603050405020304" pitchFamily="18" charset="0"/>
                 <a:cs typeface="Times New Roman" panose="02020603050405020304" pitchFamily="18" charset="0"/>
               </a:rPr>
               <a:t>lots of little support forces</a:t>

</xml_diff>